<commit_message>
minor fix on the icon
</commit_message>
<xml_diff>
--- a/Asset DevOps Pipiline v0.12.pptx
+++ b/Asset DevOps Pipiline v0.12.pptx
@@ -12315,8 +12315,8 @@
         </p:blipFill>
         <p:spPr>
           <a:xfrm>
-            <a:off x="2358832" y="5446619"/>
-            <a:ext cx="306028" cy="238022"/>
+            <a:off x="2392227" y="5446645"/>
+            <a:ext cx="266058" cy="206934"/>
           </a:xfrm>
           <a:prstGeom prst="rect">
             <a:avLst/>

</xml_diff>